<commit_message>
environment checks for access times during measurements
</commit_message>
<xml_diff>
--- a/chess3d/docs/slides/reduced_scenario_2.pptx
+++ b/chess3d/docs/slides/reduced_scenario_2.pptx
@@ -5,14 +5,16 @@
     <p:sldMasterId id="2147483684" r:id="rId1"/>
   </p:sldMasterIdLst>
   <p:notesMasterIdLst>
-    <p:notesMasterId r:id="rId7"/>
+    <p:notesMasterId r:id="rId9"/>
   </p:notesMasterIdLst>
   <p:sldIdLst>
     <p:sldId id="263" r:id="rId2"/>
     <p:sldId id="447" r:id="rId3"/>
     <p:sldId id="448" r:id="rId4"/>
     <p:sldId id="449" r:id="rId5"/>
-    <p:sldId id="412" r:id="rId6"/>
+    <p:sldId id="450" r:id="rId6"/>
+    <p:sldId id="451" r:id="rId7"/>
+    <p:sldId id="412" r:id="rId8"/>
   </p:sldIdLst>
   <p:sldSz cx="12192000" cy="6858000"/>
   <p:notesSz cx="6858000" cy="9144000"/>
@@ -201,7 +203,7 @@
           <a:p>
             <a:fld id="{95997608-F877-A844-A447-8F4AE0FF71C9}" type="datetimeFigureOut">
               <a:rPr lang="en-US" smtClean="0"/>
-              <a:t>10/3/23</a:t>
+              <a:t>10/10/23</a:t>
             </a:fld>
             <a:endParaRPr lang="en-US"/>
           </a:p>
@@ -3420,8 +3422,8 @@
           </a:p>
         </p:txBody>
       </p:sp>
-      <mc:AlternateContent xmlns:mc="http://schemas.openxmlformats.org/markup-compatibility/2006">
-        <mc:Choice xmlns:a14="http://schemas.microsoft.com/office/drawing/2010/main" Requires="a14">
+      <mc:AlternateContent xmlns:mc="http://schemas.openxmlformats.org/markup-compatibility/2006" xmlns:a14="http://schemas.microsoft.com/office/drawing/2010/main">
+        <mc:Choice Requires="a14">
           <p:sp>
             <p:nvSpPr>
               <p:cNvPr id="3" name="Content Placeholder 2">
@@ -4183,13 +4185,7 @@
                       <a:rPr lang="en-US" sz="2400" b="0" i="1" smtClean="0">
                         <a:latin typeface="Cambria Math" panose="02040503050406030204" pitchFamily="18" charset="0"/>
                       </a:rPr>
-                      <m:t> </m:t>
-                    </m:r>
-                    <m:r>
-                      <a:rPr lang="en-US" sz="2400" b="0" i="1" smtClean="0">
-                        <a:latin typeface="Cambria Math" panose="02040503050406030204" pitchFamily="18" charset="0"/>
-                      </a:rPr>
-                      <m:t>,</m:t>
+                      <m:t> ,</m:t>
                     </m:r>
                     <m:sSubSup>
                       <m:sSubSupPr>
@@ -4234,7 +4230,7 @@
             </p:txBody>
           </p:sp>
         </mc:Choice>
-        <mc:Fallback>
+        <mc:Fallback xmlns="">
           <p:sp>
             <p:nvSpPr>
               <p:cNvPr id="3" name="Content Placeholder 2">
@@ -4362,7 +4358,7 @@
             </p:spPr>
             <p:txBody>
               <a:bodyPr>
-                <a:normAutofit fontScale="77500" lnSpcReduction="20000"/>
+                <a:normAutofit fontScale="70000" lnSpcReduction="20000"/>
               </a:bodyPr>
               <a:lstStyle/>
               <a:p>
@@ -4388,13 +4384,20 @@
                 </a:pPr>
                 <a:r>
                   <a:rPr lang="en-US" dirty="0"/>
-                  <a:t>All known requests are considered</a:t>
+                  <a:t>All known measurement requests (initial + generated) are considered</a:t>
                 </a:r>
               </a:p>
               <a:p>
-                <a:pPr marL="457200" indent="-457200">
-                  <a:buFont typeface="Arial" panose="020B0604020202020204" pitchFamily="34" charset="0"/>
-                  <a:buChar char="•"/>
+                <a:r>
+                  <a:rPr lang="en-US" b="1" dirty="0"/>
+                  <a:t>FIFO – Algorithm</a:t>
+                </a:r>
+                <a:endParaRPr lang="en-US" dirty="0"/>
+              </a:p>
+              <a:p>
+                <a:pPr marL="514350" indent="-514350">
+                  <a:buFont typeface="+mj-lt"/>
+                  <a:buAutoNum type="arabicPeriod"/>
                 </a:pPr>
                 <a:r>
                   <a:rPr lang="en-US" dirty="0"/>
@@ -4402,9 +4405,9 @@
                 </a:r>
               </a:p>
               <a:p>
-                <a:pPr marL="457200" indent="-457200">
-                  <a:buFont typeface="Arial" panose="020B0604020202020204" pitchFamily="34" charset="0"/>
-                  <a:buChar char="•"/>
+                <a:pPr marL="514350" indent="-514350">
+                  <a:buFont typeface="+mj-lt"/>
+                  <a:buAutoNum type="arabicPeriod"/>
                 </a:pPr>
                 <a:r>
                   <a:rPr lang="en-US" dirty="0"/>
@@ -4412,16 +4415,16 @@
                 </a:r>
               </a:p>
               <a:p>
-                <a:pPr marL="457200" indent="-457200">
+                <a:pPr marL="514350" indent="-514350">
                   <a:lnSpc>
                     <a:spcPct val="120000"/>
                   </a:lnSpc>
-                  <a:buFont typeface="Arial" panose="020B0604020202020204" pitchFamily="34" charset="0"/>
-                  <a:buChar char="•"/>
+                  <a:buFont typeface="+mj-lt"/>
+                  <a:buAutoNum type="arabicPeriod"/>
                 </a:pPr>
                 <a:r>
                   <a:rPr lang="en-US" dirty="0"/>
-                  <a:t>Requests are scheduled following ascending access time if accessible and satisfies slewing constraint </a:t>
+                  <a:t>Requests are scheduled in ascending access time if the GP is accessible, and the observation satisfies slewing constraint </a:t>
                 </a:r>
                 <a14:m>
                   <m:oMath xmlns:m="http://schemas.openxmlformats.org/officeDocument/2006/math">
@@ -4603,7 +4606,7 @@
               <a:blipFill>
                 <a:blip r:embed="rId2"/>
                 <a:stretch>
-                  <a:fillRect l="-762" t="-2190" r="-544"/>
+                  <a:fillRect l="-653" t="-1703"/>
                 </a:stretch>
               </a:blipFill>
             </p:spPr>
@@ -4674,37 +4677,1270 @@
           <a:lstStyle/>
           <a:p>
             <a:r>
-              <a:rPr lang="en-US" dirty="0"/>
+              <a:rPr lang="en-US"/>
               <a:t>Preliminary Results</a:t>
             </a:r>
+            <a:endParaRPr lang="en-US" dirty="0"/>
           </a:p>
         </p:txBody>
       </p:sp>
-      <p:sp>
-        <p:nvSpPr>
-          <p:cNvPr id="3" name="Content Placeholder 2">
+      <p:pic>
+        <p:nvPicPr>
+          <p:cNvPr id="5" name="Content Placeholder 4" descr="A graph of events and events&#10;&#10;Description automatically generated">
             <a:extLst>
               <a:ext uri="{FF2B5EF4-FFF2-40B4-BE49-F238E27FC236}">
-                <a16:creationId xmlns:a16="http://schemas.microsoft.com/office/drawing/2014/main" id="{3FC90F49-3ABE-F4F0-77B2-3E13A3FB3CC3}"/>
+                <a16:creationId xmlns:a16="http://schemas.microsoft.com/office/drawing/2014/main" id="{FC8B4138-3C8C-CE13-B199-430D5EBAD84C}"/>
               </a:ext>
             </a:extLst>
           </p:cNvPr>
-          <p:cNvSpPr>
-            <a:spLocks noGrp="1"/>
-          </p:cNvSpPr>
+          <p:cNvPicPr>
+            <a:picLocks noGrp="1" noChangeAspect="1"/>
+          </p:cNvPicPr>
           <p:nvPr>
             <p:ph idx="1"/>
           </p:nvPr>
+        </p:nvPicPr>
+        <p:blipFill>
+          <a:blip r:embed="rId2"/>
+          <a:stretch>
+            <a:fillRect/>
+          </a:stretch>
+        </p:blipFill>
+        <p:spPr>
+          <a:xfrm>
+            <a:off x="6236834" y="1536741"/>
+            <a:ext cx="5842000" cy="4381500"/>
+          </a:xfrm>
+        </p:spPr>
+      </p:pic>
+      <p:sp>
+        <p:nvSpPr>
+          <p:cNvPr id="6" name="Content Placeholder 2">
+            <a:extLst>
+              <a:ext uri="{FF2B5EF4-FFF2-40B4-BE49-F238E27FC236}">
+                <a16:creationId xmlns:a16="http://schemas.microsoft.com/office/drawing/2014/main" id="{093651FE-AE84-D35E-DC67-7CBC62C1F450}"/>
+              </a:ext>
+            </a:extLst>
+          </p:cNvPr>
+          <p:cNvSpPr txBox="1">
+            <a:spLocks/>
+          </p:cNvSpPr>
+          <p:nvPr/>
         </p:nvSpPr>
-        <p:spPr/>
+        <p:spPr>
+          <a:xfrm>
+            <a:off x="213555" y="1682077"/>
+            <a:ext cx="5886302" cy="1226546"/>
+          </a:xfrm>
+          <a:prstGeom prst="rect">
+            <a:avLst/>
+          </a:prstGeom>
+        </p:spPr>
         <p:txBody>
-          <a:bodyPr/>
-          <a:lstStyle/>
-          <a:p>
-            <a:endParaRPr lang="en-US" dirty="0"/>
+          <a:bodyPr vert="horz" lIns="91440" tIns="45720" rIns="91440" bIns="45720" rtlCol="0">
+            <a:normAutofit fontScale="85000" lnSpcReduction="20000"/>
+          </a:bodyPr>
+          <a:lstStyle>
+            <a:lvl1pPr marL="0" indent="0" algn="l" defTabSz="914377" rtl="0" eaLnBrk="1" latinLnBrk="0" hangingPunct="1">
+              <a:lnSpc>
+                <a:spcPct val="90000"/>
+              </a:lnSpc>
+              <a:spcBef>
+                <a:spcPts val="1000"/>
+              </a:spcBef>
+              <a:buFont typeface="Arial" panose="020B0604020202020204" pitchFamily="34" charset="0"/>
+              <a:buNone/>
+              <a:defRPr sz="2800" b="0" i="0" kern="1200">
+                <a:solidFill>
+                  <a:schemeClr val="tx1"/>
+                </a:solidFill>
+                <a:latin typeface="Helvetica" pitchFamily="2" charset="0"/>
+                <a:ea typeface="+mn-ea"/>
+                <a:cs typeface="+mn-cs"/>
+              </a:defRPr>
+            </a:lvl1pPr>
+            <a:lvl2pPr marL="293688" indent="-231775" algn="l" defTabSz="914377" rtl="0" eaLnBrk="1" latinLnBrk="0" hangingPunct="1">
+              <a:lnSpc>
+                <a:spcPct val="90000"/>
+              </a:lnSpc>
+              <a:spcBef>
+                <a:spcPts val="500"/>
+              </a:spcBef>
+              <a:buFont typeface="Arial" panose="020B0604020202020204" pitchFamily="34" charset="0"/>
+              <a:buChar char="•"/>
+              <a:tabLst/>
+              <a:defRPr sz="2400" b="0" i="0" kern="1200">
+                <a:solidFill>
+                  <a:schemeClr val="tx1"/>
+                </a:solidFill>
+                <a:latin typeface="Helvetica" pitchFamily="2" charset="0"/>
+                <a:ea typeface="+mn-ea"/>
+                <a:cs typeface="+mn-cs"/>
+              </a:defRPr>
+            </a:lvl2pPr>
+            <a:lvl3pPr marL="460375" indent="-219075" algn="l" defTabSz="914377" rtl="0" eaLnBrk="1" latinLnBrk="0" hangingPunct="1">
+              <a:lnSpc>
+                <a:spcPct val="90000"/>
+              </a:lnSpc>
+              <a:spcBef>
+                <a:spcPts val="500"/>
+              </a:spcBef>
+              <a:buFont typeface="Arial" panose="020B0604020202020204" pitchFamily="34" charset="0"/>
+              <a:buChar char="•"/>
+              <a:tabLst/>
+              <a:defRPr sz="2000" b="0" i="0" kern="1200">
+                <a:solidFill>
+                  <a:schemeClr val="tx1"/>
+                </a:solidFill>
+                <a:latin typeface="Helvetica" pitchFamily="2" charset="0"/>
+                <a:ea typeface="+mn-ea"/>
+                <a:cs typeface="+mn-cs"/>
+              </a:defRPr>
+            </a:lvl3pPr>
+            <a:lvl4pPr marL="628650" indent="-230188" algn="l" defTabSz="914377" rtl="0" eaLnBrk="1" latinLnBrk="0" hangingPunct="1">
+              <a:lnSpc>
+                <a:spcPct val="90000"/>
+              </a:lnSpc>
+              <a:spcBef>
+                <a:spcPts val="500"/>
+              </a:spcBef>
+              <a:buFont typeface="Arial" panose="020B0604020202020204" pitchFamily="34" charset="0"/>
+              <a:buChar char="•"/>
+              <a:tabLst/>
+              <a:defRPr sz="1800" b="0" i="0" kern="1200">
+                <a:solidFill>
+                  <a:schemeClr val="tx1"/>
+                </a:solidFill>
+                <a:latin typeface="Helvetica" pitchFamily="2" charset="0"/>
+                <a:ea typeface="+mn-ea"/>
+                <a:cs typeface="+mn-cs"/>
+              </a:defRPr>
+            </a:lvl4pPr>
+            <a:lvl5pPr marL="808038" indent="-211138" algn="l" defTabSz="914377" rtl="0" eaLnBrk="1" latinLnBrk="0" hangingPunct="1">
+              <a:lnSpc>
+                <a:spcPct val="90000"/>
+              </a:lnSpc>
+              <a:spcBef>
+                <a:spcPts val="500"/>
+              </a:spcBef>
+              <a:buFont typeface="Arial" panose="020B0604020202020204" pitchFamily="34" charset="0"/>
+              <a:buChar char="•"/>
+              <a:tabLst/>
+              <a:defRPr sz="1800" b="0" i="0" kern="1200">
+                <a:solidFill>
+                  <a:schemeClr val="tx1"/>
+                </a:solidFill>
+                <a:latin typeface="Helvetica" pitchFamily="2" charset="0"/>
+                <a:ea typeface="+mn-ea"/>
+                <a:cs typeface="+mn-cs"/>
+              </a:defRPr>
+            </a:lvl5pPr>
+            <a:lvl6pPr marL="2514537" indent="-228594" algn="l" defTabSz="914377" rtl="0" eaLnBrk="1" latinLnBrk="0" hangingPunct="1">
+              <a:lnSpc>
+                <a:spcPct val="90000"/>
+              </a:lnSpc>
+              <a:spcBef>
+                <a:spcPts val="500"/>
+              </a:spcBef>
+              <a:buFont typeface="Arial" panose="020B0604020202020204" pitchFamily="34" charset="0"/>
+              <a:buChar char="•"/>
+              <a:defRPr sz="1800" kern="1200">
+                <a:solidFill>
+                  <a:schemeClr val="tx1"/>
+                </a:solidFill>
+                <a:latin typeface="+mn-lt"/>
+                <a:ea typeface="+mn-ea"/>
+                <a:cs typeface="+mn-cs"/>
+              </a:defRPr>
+            </a:lvl6pPr>
+            <a:lvl7pPr marL="2971726" indent="-228594" algn="l" defTabSz="914377" rtl="0" eaLnBrk="1" latinLnBrk="0" hangingPunct="1">
+              <a:lnSpc>
+                <a:spcPct val="90000"/>
+              </a:lnSpc>
+              <a:spcBef>
+                <a:spcPts val="500"/>
+              </a:spcBef>
+              <a:buFont typeface="Arial" panose="020B0604020202020204" pitchFamily="34" charset="0"/>
+              <a:buChar char="•"/>
+              <a:defRPr sz="1800" kern="1200">
+                <a:solidFill>
+                  <a:schemeClr val="tx1"/>
+                </a:solidFill>
+                <a:latin typeface="+mn-lt"/>
+                <a:ea typeface="+mn-ea"/>
+                <a:cs typeface="+mn-cs"/>
+              </a:defRPr>
+            </a:lvl7pPr>
+            <a:lvl8pPr marL="3428914" indent="-228594" algn="l" defTabSz="914377" rtl="0" eaLnBrk="1" latinLnBrk="0" hangingPunct="1">
+              <a:lnSpc>
+                <a:spcPct val="90000"/>
+              </a:lnSpc>
+              <a:spcBef>
+                <a:spcPts val="500"/>
+              </a:spcBef>
+              <a:buFont typeface="Arial" panose="020B0604020202020204" pitchFamily="34" charset="0"/>
+              <a:buChar char="•"/>
+              <a:defRPr sz="1800" kern="1200">
+                <a:solidFill>
+                  <a:schemeClr val="tx1"/>
+                </a:solidFill>
+                <a:latin typeface="+mn-lt"/>
+                <a:ea typeface="+mn-ea"/>
+                <a:cs typeface="+mn-cs"/>
+              </a:defRPr>
+            </a:lvl8pPr>
+            <a:lvl9pPr marL="3886103" indent="-228594" algn="l" defTabSz="914377" rtl="0" eaLnBrk="1" latinLnBrk="0" hangingPunct="1">
+              <a:lnSpc>
+                <a:spcPct val="90000"/>
+              </a:lnSpc>
+              <a:spcBef>
+                <a:spcPts val="500"/>
+              </a:spcBef>
+              <a:buFont typeface="Arial" panose="020B0604020202020204" pitchFamily="34" charset="0"/>
+              <a:buChar char="•"/>
+              <a:defRPr sz="1800" kern="1200">
+                <a:solidFill>
+                  <a:schemeClr val="tx1"/>
+                </a:solidFill>
+                <a:latin typeface="+mn-lt"/>
+                <a:ea typeface="+mn-ea"/>
+                <a:cs typeface="+mn-cs"/>
+              </a:defRPr>
+            </a:lvl9pPr>
+          </a:lstStyle>
+          <a:p>
+            <a:r>
+              <a:rPr lang="en-US" sz="1800" b="1" dirty="0"/>
+              <a:t>Definitions</a:t>
+            </a:r>
+            <a:endParaRPr lang="en-US" sz="1400" b="1" dirty="0"/>
+          </a:p>
+          <a:p>
+            <a:pPr marL="457200" indent="-457200">
+              <a:buFont typeface="Arial" panose="020B0604020202020204" pitchFamily="34" charset="0"/>
+              <a:buChar char="•"/>
+            </a:pPr>
+            <a:r>
+              <a:rPr lang="en-US" sz="1400" i="1" dirty="0"/>
+              <a:t>Detected Event</a:t>
+            </a:r>
+            <a:r>
+              <a:rPr lang="en-US" sz="1400" dirty="0"/>
+              <a:t>: an algae-bloom event GP was measured by an agent performing an unrelated measurement request. Results in a measurement request being generated</a:t>
+            </a:r>
+          </a:p>
+          <a:p>
+            <a:pPr marL="457200" indent="-457200">
+              <a:buFont typeface="Arial" panose="020B0604020202020204" pitchFamily="34" charset="0"/>
+              <a:buChar char="•"/>
+            </a:pPr>
+            <a:r>
+              <a:rPr lang="en-US" sz="1400" i="1" dirty="0"/>
+              <a:t>Observed Event</a:t>
+            </a:r>
+            <a:r>
+              <a:rPr lang="en-US" sz="1400" dirty="0"/>
+              <a:t>: at least one agent performed a measurement request generated from an event detection</a:t>
+            </a:r>
           </a:p>
         </p:txBody>
       </p:sp>
+      <p:graphicFrame>
+        <p:nvGraphicFramePr>
+          <p:cNvPr id="7" name="Table 7">
+            <a:extLst>
+              <a:ext uri="{FF2B5EF4-FFF2-40B4-BE49-F238E27FC236}">
+                <a16:creationId xmlns:a16="http://schemas.microsoft.com/office/drawing/2014/main" id="{E134AC47-B86E-BD2D-4EAB-D90F4114F558}"/>
+              </a:ext>
+            </a:extLst>
+          </p:cNvPr>
+          <p:cNvGraphicFramePr>
+            <a:graphicFrameLocks noGrp="1"/>
+          </p:cNvGraphicFramePr>
+          <p:nvPr>
+            <p:extLst>
+              <p:ext uri="{D42A27DB-BD31-4B8C-83A1-F6EECF244321}">
+                <p14:modId xmlns:p14="http://schemas.microsoft.com/office/powerpoint/2010/main" val="2845878781"/>
+              </p:ext>
+            </p:extLst>
+          </p:nvPr>
+        </p:nvGraphicFramePr>
+        <p:xfrm>
+          <a:off x="266217" y="3217642"/>
+          <a:ext cx="5825282" cy="2212621"/>
+        </p:xfrm>
+        <a:graphic>
+          <a:graphicData uri="http://schemas.openxmlformats.org/drawingml/2006/table">
+            <a:tbl>
+              <a:tblPr firstRow="1" bandRow="1">
+                <a:tableStyleId>{2D5ABB26-0587-4C30-8999-92F81FD0307C}</a:tableStyleId>
+              </a:tblPr>
+              <a:tblGrid>
+                <a:gridCol w="1411192">
+                  <a:extLst>
+                    <a:ext uri="{9D8B030D-6E8A-4147-A177-3AD203B41FA5}">
+                      <a16:colId xmlns:a16="http://schemas.microsoft.com/office/drawing/2014/main" val="3835121873"/>
+                    </a:ext>
+                  </a:extLst>
+                </a:gridCol>
+                <a:gridCol w="3393351">
+                  <a:extLst>
+                    <a:ext uri="{9D8B030D-6E8A-4147-A177-3AD203B41FA5}">
+                      <a16:colId xmlns:a16="http://schemas.microsoft.com/office/drawing/2014/main" val="422156455"/>
+                    </a:ext>
+                  </a:extLst>
+                </a:gridCol>
+                <a:gridCol w="1020739">
+                  <a:extLst>
+                    <a:ext uri="{9D8B030D-6E8A-4147-A177-3AD203B41FA5}">
+                      <a16:colId xmlns:a16="http://schemas.microsoft.com/office/drawing/2014/main" val="2623150095"/>
+                    </a:ext>
+                  </a:extLst>
+                </a:gridCol>
+              </a:tblGrid>
+              <a:tr h="346279">
+                <a:tc>
+                  <a:txBody>
+                    <a:bodyPr/>
+                    <a:lstStyle/>
+                    <a:p>
+                      <a:r>
+                        <a:rPr lang="en-US" sz="1200" b="1" dirty="0">
+                          <a:solidFill>
+                            <a:schemeClr val="bg1"/>
+                          </a:solidFill>
+                        </a:rPr>
+                        <a:t>Planning Strategy</a:t>
+                      </a:r>
+                    </a:p>
+                  </a:txBody>
+                  <a:tcPr anchor="ctr">
+                    <a:lnL w="12700" cap="flat" cmpd="sng" algn="ctr">
+                      <a:solidFill>
+                        <a:schemeClr val="tx1"/>
+                      </a:solidFill>
+                      <a:prstDash val="solid"/>
+                      <a:round/>
+                      <a:headEnd type="none" w="med" len="med"/>
+                      <a:tailEnd type="none" w="med" len="med"/>
+                    </a:lnL>
+                    <a:lnR w="12700" cap="flat" cmpd="sng" algn="ctr">
+                      <a:solidFill>
+                        <a:schemeClr val="tx1"/>
+                      </a:solidFill>
+                      <a:prstDash val="solid"/>
+                      <a:round/>
+                      <a:headEnd type="none" w="med" len="med"/>
+                      <a:tailEnd type="none" w="med" len="med"/>
+                    </a:lnR>
+                    <a:lnT w="12700" cap="flat" cmpd="sng" algn="ctr">
+                      <a:solidFill>
+                        <a:schemeClr val="tx1"/>
+                      </a:solidFill>
+                      <a:prstDash val="solid"/>
+                      <a:round/>
+                      <a:headEnd type="none" w="med" len="med"/>
+                      <a:tailEnd type="none" w="med" len="med"/>
+                    </a:lnT>
+                    <a:lnB w="12700" cap="flat" cmpd="sng" algn="ctr">
+                      <a:solidFill>
+                        <a:schemeClr val="tx1"/>
+                      </a:solidFill>
+                      <a:prstDash val="solid"/>
+                      <a:round/>
+                      <a:headEnd type="none" w="med" len="med"/>
+                      <a:tailEnd type="none" w="med" len="med"/>
+                    </a:lnB>
+                    <a:solidFill>
+                      <a:schemeClr val="bg1">
+                        <a:lumMod val="50000"/>
+                      </a:schemeClr>
+                    </a:solidFill>
+                  </a:tcPr>
+                </a:tc>
+                <a:tc>
+                  <a:txBody>
+                    <a:bodyPr/>
+                    <a:lstStyle/>
+                    <a:p>
+                      <a:r>
+                        <a:rPr lang="en-US" sz="1200" b="1" dirty="0">
+                          <a:solidFill>
+                            <a:schemeClr val="bg1"/>
+                          </a:solidFill>
+                        </a:rPr>
+                        <a:t>Replans when</a:t>
+                      </a:r>
+                    </a:p>
+                  </a:txBody>
+                  <a:tcPr anchor="ctr">
+                    <a:lnL w="12700" cap="flat" cmpd="sng" algn="ctr">
+                      <a:solidFill>
+                        <a:schemeClr val="tx1"/>
+                      </a:solidFill>
+                      <a:prstDash val="solid"/>
+                      <a:round/>
+                      <a:headEnd type="none" w="med" len="med"/>
+                      <a:tailEnd type="none" w="med" len="med"/>
+                    </a:lnL>
+                    <a:lnR w="12700" cap="flat" cmpd="sng" algn="ctr">
+                      <a:solidFill>
+                        <a:schemeClr val="tx1"/>
+                      </a:solidFill>
+                      <a:prstDash val="solid"/>
+                      <a:round/>
+                      <a:headEnd type="none" w="med" len="med"/>
+                      <a:tailEnd type="none" w="med" len="med"/>
+                    </a:lnR>
+                    <a:lnT w="12700" cap="flat" cmpd="sng" algn="ctr">
+                      <a:solidFill>
+                        <a:schemeClr val="tx1"/>
+                      </a:solidFill>
+                      <a:prstDash val="solid"/>
+                      <a:round/>
+                      <a:headEnd type="none" w="med" len="med"/>
+                      <a:tailEnd type="none" w="med" len="med"/>
+                    </a:lnT>
+                    <a:lnB w="12700" cap="flat" cmpd="sng" algn="ctr">
+                      <a:solidFill>
+                        <a:schemeClr val="tx1"/>
+                      </a:solidFill>
+                      <a:prstDash val="solid"/>
+                      <a:round/>
+                      <a:headEnd type="none" w="med" len="med"/>
+                      <a:tailEnd type="none" w="med" len="med"/>
+                    </a:lnB>
+                    <a:solidFill>
+                      <a:schemeClr val="bg1">
+                        <a:lumMod val="50000"/>
+                      </a:schemeClr>
+                    </a:solidFill>
+                  </a:tcPr>
+                </a:tc>
+                <a:tc>
+                  <a:txBody>
+                    <a:bodyPr/>
+                    <a:lstStyle/>
+                    <a:p>
+                      <a:r>
+                        <a:rPr lang="en-US" sz="1200" b="1" dirty="0">
+                          <a:solidFill>
+                            <a:schemeClr val="bg1"/>
+                          </a:solidFill>
+                        </a:rPr>
+                        <a:t>Planning Horizon</a:t>
+                      </a:r>
+                    </a:p>
+                  </a:txBody>
+                  <a:tcPr anchor="ctr">
+                    <a:lnL w="12700" cap="flat" cmpd="sng" algn="ctr">
+                      <a:solidFill>
+                        <a:schemeClr val="tx1"/>
+                      </a:solidFill>
+                      <a:prstDash val="solid"/>
+                      <a:round/>
+                      <a:headEnd type="none" w="med" len="med"/>
+                      <a:tailEnd type="none" w="med" len="med"/>
+                    </a:lnL>
+                    <a:lnR w="12700" cap="flat" cmpd="sng" algn="ctr">
+                      <a:solidFill>
+                        <a:schemeClr val="tx1"/>
+                      </a:solidFill>
+                      <a:prstDash val="solid"/>
+                      <a:round/>
+                      <a:headEnd type="none" w="med" len="med"/>
+                      <a:tailEnd type="none" w="med" len="med"/>
+                    </a:lnR>
+                    <a:lnT w="12700" cap="flat" cmpd="sng" algn="ctr">
+                      <a:solidFill>
+                        <a:schemeClr val="tx1"/>
+                      </a:solidFill>
+                      <a:prstDash val="solid"/>
+                      <a:round/>
+                      <a:headEnd type="none" w="med" len="med"/>
+                      <a:tailEnd type="none" w="med" len="med"/>
+                    </a:lnT>
+                    <a:lnB w="12700" cap="flat" cmpd="sng" algn="ctr">
+                      <a:solidFill>
+                        <a:schemeClr val="tx1"/>
+                      </a:solidFill>
+                      <a:prstDash val="solid"/>
+                      <a:round/>
+                      <a:headEnd type="none" w="med" len="med"/>
+                      <a:tailEnd type="none" w="med" len="med"/>
+                    </a:lnB>
+                    <a:solidFill>
+                      <a:schemeClr val="bg1">
+                        <a:lumMod val="50000"/>
+                      </a:schemeClr>
+                    </a:solidFill>
+                  </a:tcPr>
+                </a:tc>
+                <a:extLst>
+                  <a:ext uri="{0D108BD9-81ED-4DB2-BD59-A6C34878D82A}">
+                    <a16:rowId xmlns:a16="http://schemas.microsoft.com/office/drawing/2014/main" val="2860078693"/>
+                  </a:ext>
+                </a:extLst>
+              </a:tr>
+              <a:tr h="207767">
+                <a:tc>
+                  <a:txBody>
+                    <a:bodyPr/>
+                    <a:lstStyle/>
+                    <a:p>
+                      <a:r>
+                        <a:rPr lang="en-US" sz="1200" i="1" dirty="0"/>
+                        <a:t>No Replanning</a:t>
+                      </a:r>
+                    </a:p>
+                  </a:txBody>
+                  <a:tcPr>
+                    <a:lnL w="12700" cap="flat" cmpd="sng" algn="ctr">
+                      <a:solidFill>
+                        <a:schemeClr val="tx1"/>
+                      </a:solidFill>
+                      <a:prstDash val="solid"/>
+                      <a:round/>
+                      <a:headEnd type="none" w="med" len="med"/>
+                      <a:tailEnd type="none" w="med" len="med"/>
+                    </a:lnL>
+                    <a:lnR w="12700" cap="flat" cmpd="sng" algn="ctr">
+                      <a:solidFill>
+                        <a:schemeClr val="tx1"/>
+                      </a:solidFill>
+                      <a:prstDash val="solid"/>
+                      <a:round/>
+                      <a:headEnd type="none" w="med" len="med"/>
+                      <a:tailEnd type="none" w="med" len="med"/>
+                    </a:lnR>
+                    <a:lnT w="12700" cap="flat" cmpd="sng" algn="ctr">
+                      <a:solidFill>
+                        <a:schemeClr val="tx1"/>
+                      </a:solidFill>
+                      <a:prstDash val="solid"/>
+                      <a:round/>
+                      <a:headEnd type="none" w="med" len="med"/>
+                      <a:tailEnd type="none" w="med" len="med"/>
+                    </a:lnT>
+                    <a:lnB w="12700" cap="flat" cmpd="sng" algn="ctr">
+                      <a:solidFill>
+                        <a:schemeClr val="tx1"/>
+                      </a:solidFill>
+                      <a:prstDash val="solid"/>
+                      <a:round/>
+                      <a:headEnd type="none" w="med" len="med"/>
+                      <a:tailEnd type="none" w="med" len="med"/>
+                    </a:lnB>
+                  </a:tcPr>
+                </a:tc>
+                <a:tc>
+                  <a:txBody>
+                    <a:bodyPr/>
+                    <a:lstStyle/>
+                    <a:p>
+                      <a:r>
+                        <a:rPr lang="en-US" sz="1200" dirty="0"/>
+                        <a:t>Simulation starts</a:t>
+                      </a:r>
+                    </a:p>
+                  </a:txBody>
+                  <a:tcPr>
+                    <a:lnL w="12700" cap="flat" cmpd="sng" algn="ctr">
+                      <a:solidFill>
+                        <a:schemeClr val="tx1"/>
+                      </a:solidFill>
+                      <a:prstDash val="solid"/>
+                      <a:round/>
+                      <a:headEnd type="none" w="med" len="med"/>
+                      <a:tailEnd type="none" w="med" len="med"/>
+                    </a:lnL>
+                    <a:lnR w="12700" cap="flat" cmpd="sng" algn="ctr">
+                      <a:solidFill>
+                        <a:schemeClr val="tx1"/>
+                      </a:solidFill>
+                      <a:prstDash val="solid"/>
+                      <a:round/>
+                      <a:headEnd type="none" w="med" len="med"/>
+                      <a:tailEnd type="none" w="med" len="med"/>
+                    </a:lnR>
+                    <a:lnT w="12700" cap="flat" cmpd="sng" algn="ctr">
+                      <a:solidFill>
+                        <a:schemeClr val="tx1"/>
+                      </a:solidFill>
+                      <a:prstDash val="solid"/>
+                      <a:round/>
+                      <a:headEnd type="none" w="med" len="med"/>
+                      <a:tailEnd type="none" w="med" len="med"/>
+                    </a:lnT>
+                    <a:lnB w="12700" cap="flat" cmpd="sng" algn="ctr">
+                      <a:solidFill>
+                        <a:schemeClr val="tx1"/>
+                      </a:solidFill>
+                      <a:prstDash val="solid"/>
+                      <a:round/>
+                      <a:headEnd type="none" w="med" len="med"/>
+                      <a:tailEnd type="none" w="med" len="med"/>
+                    </a:lnB>
+                  </a:tcPr>
+                </a:tc>
+                <a:tc>
+                  <a:txBody>
+                    <a:bodyPr/>
+                    <a:lstStyle/>
+                    <a:p>
+                      <a:r>
+                        <a:rPr lang="en-US" sz="1200" dirty="0"/>
+                        <a:t>1 day</a:t>
+                      </a:r>
+                    </a:p>
+                  </a:txBody>
+                  <a:tcPr>
+                    <a:lnL w="12700" cap="flat" cmpd="sng" algn="ctr">
+                      <a:solidFill>
+                        <a:schemeClr val="tx1"/>
+                      </a:solidFill>
+                      <a:prstDash val="solid"/>
+                      <a:round/>
+                      <a:headEnd type="none" w="med" len="med"/>
+                      <a:tailEnd type="none" w="med" len="med"/>
+                    </a:lnL>
+                    <a:lnR w="12700" cap="flat" cmpd="sng" algn="ctr">
+                      <a:solidFill>
+                        <a:schemeClr val="tx1"/>
+                      </a:solidFill>
+                      <a:prstDash val="solid"/>
+                      <a:round/>
+                      <a:headEnd type="none" w="med" len="med"/>
+                      <a:tailEnd type="none" w="med" len="med"/>
+                    </a:lnR>
+                    <a:lnT w="12700" cap="flat" cmpd="sng" algn="ctr">
+                      <a:solidFill>
+                        <a:schemeClr val="tx1"/>
+                      </a:solidFill>
+                      <a:prstDash val="solid"/>
+                      <a:round/>
+                      <a:headEnd type="none" w="med" len="med"/>
+                      <a:tailEnd type="none" w="med" len="med"/>
+                    </a:lnT>
+                    <a:lnB w="12700" cap="flat" cmpd="sng" algn="ctr">
+                      <a:solidFill>
+                        <a:schemeClr val="tx1"/>
+                      </a:solidFill>
+                      <a:prstDash val="solid"/>
+                      <a:round/>
+                      <a:headEnd type="none" w="med" len="med"/>
+                      <a:tailEnd type="none" w="med" len="med"/>
+                    </a:lnB>
+                  </a:tcPr>
+                </a:tc>
+                <a:extLst>
+                  <a:ext uri="{0D108BD9-81ED-4DB2-BD59-A6C34878D82A}">
+                    <a16:rowId xmlns:a16="http://schemas.microsoft.com/office/drawing/2014/main" val="4056980915"/>
+                  </a:ext>
+                </a:extLst>
+              </a:tr>
+              <a:tr h="346279">
+                <a:tc>
+                  <a:txBody>
+                    <a:bodyPr/>
+                    <a:lstStyle/>
+                    <a:p>
+                      <a:r>
+                        <a:rPr lang="en-US" sz="1200" i="1" dirty="0"/>
+                        <a:t>Periodic Planning</a:t>
+                      </a:r>
+                    </a:p>
+                  </a:txBody>
+                  <a:tcPr>
+                    <a:lnL w="12700" cap="flat" cmpd="sng" algn="ctr">
+                      <a:solidFill>
+                        <a:schemeClr val="tx1"/>
+                      </a:solidFill>
+                      <a:prstDash val="solid"/>
+                      <a:round/>
+                      <a:headEnd type="none" w="med" len="med"/>
+                      <a:tailEnd type="none" w="med" len="med"/>
+                    </a:lnL>
+                    <a:lnR w="12700" cap="flat" cmpd="sng" algn="ctr">
+                      <a:solidFill>
+                        <a:schemeClr val="tx1"/>
+                      </a:solidFill>
+                      <a:prstDash val="solid"/>
+                      <a:round/>
+                      <a:headEnd type="none" w="med" len="med"/>
+                      <a:tailEnd type="none" w="med" len="med"/>
+                    </a:lnR>
+                    <a:lnT w="12700" cap="flat" cmpd="sng" algn="ctr">
+                      <a:solidFill>
+                        <a:schemeClr val="tx1"/>
+                      </a:solidFill>
+                      <a:prstDash val="solid"/>
+                      <a:round/>
+                      <a:headEnd type="none" w="med" len="med"/>
+                      <a:tailEnd type="none" w="med" len="med"/>
+                    </a:lnT>
+                    <a:lnB w="12700" cap="flat" cmpd="sng" algn="ctr">
+                      <a:solidFill>
+                        <a:schemeClr val="tx1"/>
+                      </a:solidFill>
+                      <a:prstDash val="solid"/>
+                      <a:round/>
+                      <a:headEnd type="none" w="med" len="med"/>
+                      <a:tailEnd type="none" w="med" len="med"/>
+                    </a:lnB>
+                  </a:tcPr>
+                </a:tc>
+                <a:tc>
+                  <a:txBody>
+                    <a:bodyPr/>
+                    <a:lstStyle/>
+                    <a:p>
+                      <a:pPr marL="0" marR="0" lvl="0" indent="0" algn="l" defTabSz="914377" rtl="0" eaLnBrk="1" fontAlgn="auto" latinLnBrk="0" hangingPunct="1">
+                        <a:lnSpc>
+                          <a:spcPct val="100000"/>
+                        </a:lnSpc>
+                        <a:spcBef>
+                          <a:spcPts val="0"/>
+                        </a:spcBef>
+                        <a:spcAft>
+                          <a:spcPts val="0"/>
+                        </a:spcAft>
+                        <a:buClrTx/>
+                        <a:buSzTx/>
+                        <a:buFontTx/>
+                        <a:buNone/>
+                        <a:tabLst/>
+                        <a:defRPr/>
+                      </a:pPr>
+                      <a:r>
+                        <a:rPr lang="en-US" sz="1200" dirty="0"/>
+                        <a:t>The start of a new planning horizon is reached</a:t>
+                      </a:r>
+                    </a:p>
+                  </a:txBody>
+                  <a:tcPr>
+                    <a:lnL w="12700" cap="flat" cmpd="sng" algn="ctr">
+                      <a:solidFill>
+                        <a:schemeClr val="tx1"/>
+                      </a:solidFill>
+                      <a:prstDash val="solid"/>
+                      <a:round/>
+                      <a:headEnd type="none" w="med" len="med"/>
+                      <a:tailEnd type="none" w="med" len="med"/>
+                    </a:lnL>
+                    <a:lnR w="12700" cap="flat" cmpd="sng" algn="ctr">
+                      <a:solidFill>
+                        <a:schemeClr val="tx1"/>
+                      </a:solidFill>
+                      <a:prstDash val="solid"/>
+                      <a:round/>
+                      <a:headEnd type="none" w="med" len="med"/>
+                      <a:tailEnd type="none" w="med" len="med"/>
+                    </a:lnR>
+                    <a:lnT w="12700" cap="flat" cmpd="sng" algn="ctr">
+                      <a:solidFill>
+                        <a:schemeClr val="tx1"/>
+                      </a:solidFill>
+                      <a:prstDash val="solid"/>
+                      <a:round/>
+                      <a:headEnd type="none" w="med" len="med"/>
+                      <a:tailEnd type="none" w="med" len="med"/>
+                    </a:lnT>
+                    <a:lnB w="12700" cap="flat" cmpd="sng" algn="ctr">
+                      <a:solidFill>
+                        <a:schemeClr val="tx1"/>
+                      </a:solidFill>
+                      <a:prstDash val="solid"/>
+                      <a:round/>
+                      <a:headEnd type="none" w="med" len="med"/>
+                      <a:tailEnd type="none" w="med" len="med"/>
+                    </a:lnB>
+                  </a:tcPr>
+                </a:tc>
+                <a:tc>
+                  <a:txBody>
+                    <a:bodyPr/>
+                    <a:lstStyle/>
+                    <a:p>
+                      <a:r>
+                        <a:rPr lang="en-US" sz="1200" dirty="0"/>
+                        <a:t>1 </a:t>
+                      </a:r>
+                      <a:r>
+                        <a:rPr lang="en-US" sz="1200" dirty="0" err="1"/>
+                        <a:t>hr</a:t>
+                      </a:r>
+                      <a:endParaRPr lang="en-US" sz="1200" dirty="0"/>
+                    </a:p>
+                  </a:txBody>
+                  <a:tcPr>
+                    <a:lnL w="12700" cap="flat" cmpd="sng" algn="ctr">
+                      <a:solidFill>
+                        <a:schemeClr val="tx1"/>
+                      </a:solidFill>
+                      <a:prstDash val="solid"/>
+                      <a:round/>
+                      <a:headEnd type="none" w="med" len="med"/>
+                      <a:tailEnd type="none" w="med" len="med"/>
+                    </a:lnL>
+                    <a:lnR w="12700" cap="flat" cmpd="sng" algn="ctr">
+                      <a:solidFill>
+                        <a:schemeClr val="tx1"/>
+                      </a:solidFill>
+                      <a:prstDash val="solid"/>
+                      <a:round/>
+                      <a:headEnd type="none" w="med" len="med"/>
+                      <a:tailEnd type="none" w="med" len="med"/>
+                    </a:lnR>
+                    <a:lnT w="12700" cap="flat" cmpd="sng" algn="ctr">
+                      <a:solidFill>
+                        <a:schemeClr val="tx1"/>
+                      </a:solidFill>
+                      <a:prstDash val="solid"/>
+                      <a:round/>
+                      <a:headEnd type="none" w="med" len="med"/>
+                      <a:tailEnd type="none" w="med" len="med"/>
+                    </a:lnT>
+                    <a:lnB w="12700" cap="flat" cmpd="sng" algn="ctr">
+                      <a:solidFill>
+                        <a:schemeClr val="tx1"/>
+                      </a:solidFill>
+                      <a:prstDash val="solid"/>
+                      <a:round/>
+                      <a:headEnd type="none" w="med" len="med"/>
+                      <a:tailEnd type="none" w="med" len="med"/>
+                    </a:lnB>
+                  </a:tcPr>
+                </a:tc>
+                <a:extLst>
+                  <a:ext uri="{0D108BD9-81ED-4DB2-BD59-A6C34878D82A}">
+                    <a16:rowId xmlns:a16="http://schemas.microsoft.com/office/drawing/2014/main" val="2205075761"/>
+                  </a:ext>
+                </a:extLst>
+              </a:tr>
+              <a:tr h="493401">
+                <a:tc>
+                  <a:txBody>
+                    <a:bodyPr/>
+                    <a:lstStyle/>
+                    <a:p>
+                      <a:r>
+                        <a:rPr lang="en-US" sz="1200" i="1" dirty="0"/>
+                        <a:t>Event-Driven Replanning</a:t>
+                      </a:r>
+                    </a:p>
+                  </a:txBody>
+                  <a:tcPr>
+                    <a:lnL w="12700" cap="flat" cmpd="sng" algn="ctr">
+                      <a:solidFill>
+                        <a:schemeClr val="tx1"/>
+                      </a:solidFill>
+                      <a:prstDash val="solid"/>
+                      <a:round/>
+                      <a:headEnd type="none" w="med" len="med"/>
+                      <a:tailEnd type="none" w="med" len="med"/>
+                    </a:lnL>
+                    <a:lnR w="12700" cap="flat" cmpd="sng" algn="ctr">
+                      <a:solidFill>
+                        <a:schemeClr val="tx1"/>
+                      </a:solidFill>
+                      <a:prstDash val="solid"/>
+                      <a:round/>
+                      <a:headEnd type="none" w="med" len="med"/>
+                      <a:tailEnd type="none" w="med" len="med"/>
+                    </a:lnR>
+                    <a:lnT w="12700" cap="flat" cmpd="sng" algn="ctr">
+                      <a:solidFill>
+                        <a:schemeClr val="tx1"/>
+                      </a:solidFill>
+                      <a:prstDash val="solid"/>
+                      <a:round/>
+                      <a:headEnd type="none" w="med" len="med"/>
+                      <a:tailEnd type="none" w="med" len="med"/>
+                    </a:lnT>
+                    <a:lnB w="12700" cap="flat" cmpd="sng" algn="ctr">
+                      <a:solidFill>
+                        <a:schemeClr val="tx1"/>
+                      </a:solidFill>
+                      <a:prstDash val="solid"/>
+                      <a:round/>
+                      <a:headEnd type="none" w="med" len="med"/>
+                      <a:tailEnd type="none" w="med" len="med"/>
+                    </a:lnB>
+                  </a:tcPr>
+                </a:tc>
+                <a:tc>
+                  <a:txBody>
+                    <a:bodyPr/>
+                    <a:lstStyle/>
+                    <a:p>
+                      <a:r>
+                        <a:rPr lang="en-US" sz="1200" dirty="0"/>
+                        <a:t>New doable measurement requests are received</a:t>
+                      </a:r>
+                    </a:p>
+                  </a:txBody>
+                  <a:tcPr>
+                    <a:lnL w="12700" cap="flat" cmpd="sng" algn="ctr">
+                      <a:solidFill>
+                        <a:schemeClr val="tx1"/>
+                      </a:solidFill>
+                      <a:prstDash val="solid"/>
+                      <a:round/>
+                      <a:headEnd type="none" w="med" len="med"/>
+                      <a:tailEnd type="none" w="med" len="med"/>
+                    </a:lnL>
+                    <a:lnR w="12700" cap="flat" cmpd="sng" algn="ctr">
+                      <a:solidFill>
+                        <a:schemeClr val="tx1"/>
+                      </a:solidFill>
+                      <a:prstDash val="solid"/>
+                      <a:round/>
+                      <a:headEnd type="none" w="med" len="med"/>
+                      <a:tailEnd type="none" w="med" len="med"/>
+                    </a:lnR>
+                    <a:lnT w="12700" cap="flat" cmpd="sng" algn="ctr">
+                      <a:solidFill>
+                        <a:schemeClr val="tx1"/>
+                      </a:solidFill>
+                      <a:prstDash val="solid"/>
+                      <a:round/>
+                      <a:headEnd type="none" w="med" len="med"/>
+                      <a:tailEnd type="none" w="med" len="med"/>
+                    </a:lnT>
+                    <a:lnB w="12700" cap="flat" cmpd="sng" algn="ctr">
+                      <a:solidFill>
+                        <a:schemeClr val="tx1"/>
+                      </a:solidFill>
+                      <a:prstDash val="solid"/>
+                      <a:round/>
+                      <a:headEnd type="none" w="med" len="med"/>
+                      <a:tailEnd type="none" w="med" len="med"/>
+                    </a:lnB>
+                  </a:tcPr>
+                </a:tc>
+                <a:tc>
+                  <a:txBody>
+                    <a:bodyPr/>
+                    <a:lstStyle/>
+                    <a:p>
+                      <a:r>
+                        <a:rPr lang="en-US" sz="1200" dirty="0"/>
+                        <a:t>1 day</a:t>
+                      </a:r>
+                    </a:p>
+                  </a:txBody>
+                  <a:tcPr>
+                    <a:lnL w="12700" cap="flat" cmpd="sng" algn="ctr">
+                      <a:solidFill>
+                        <a:schemeClr val="tx1"/>
+                      </a:solidFill>
+                      <a:prstDash val="solid"/>
+                      <a:round/>
+                      <a:headEnd type="none" w="med" len="med"/>
+                      <a:tailEnd type="none" w="med" len="med"/>
+                    </a:lnL>
+                    <a:lnR w="12700" cap="flat" cmpd="sng" algn="ctr">
+                      <a:solidFill>
+                        <a:schemeClr val="tx1"/>
+                      </a:solidFill>
+                      <a:prstDash val="solid"/>
+                      <a:round/>
+                      <a:headEnd type="none" w="med" len="med"/>
+                      <a:tailEnd type="none" w="med" len="med"/>
+                    </a:lnR>
+                    <a:lnT w="12700" cap="flat" cmpd="sng" algn="ctr">
+                      <a:solidFill>
+                        <a:schemeClr val="tx1"/>
+                      </a:solidFill>
+                      <a:prstDash val="solid"/>
+                      <a:round/>
+                      <a:headEnd type="none" w="med" len="med"/>
+                      <a:tailEnd type="none" w="med" len="med"/>
+                    </a:lnT>
+                    <a:lnB w="12700" cap="flat" cmpd="sng" algn="ctr">
+                      <a:solidFill>
+                        <a:schemeClr val="tx1"/>
+                      </a:solidFill>
+                      <a:prstDash val="solid"/>
+                      <a:round/>
+                      <a:headEnd type="none" w="med" len="med"/>
+                      <a:tailEnd type="none" w="med" len="med"/>
+                    </a:lnB>
+                  </a:tcPr>
+                </a:tc>
+                <a:extLst>
+                  <a:ext uri="{0D108BD9-81ED-4DB2-BD59-A6C34878D82A}">
+                    <a16:rowId xmlns:a16="http://schemas.microsoft.com/office/drawing/2014/main" val="1857927260"/>
+                  </a:ext>
+                </a:extLst>
+              </a:tr>
+              <a:tr h="641421">
+                <a:tc>
+                  <a:txBody>
+                    <a:bodyPr/>
+                    <a:lstStyle/>
+                    <a:p>
+                      <a:pPr marL="0" marR="0" lvl="0" indent="0" algn="l" defTabSz="914377" rtl="0" eaLnBrk="1" fontAlgn="auto" latinLnBrk="0" hangingPunct="1">
+                        <a:lnSpc>
+                          <a:spcPct val="100000"/>
+                        </a:lnSpc>
+                        <a:spcBef>
+                          <a:spcPts val="0"/>
+                        </a:spcBef>
+                        <a:spcAft>
+                          <a:spcPts val="0"/>
+                        </a:spcAft>
+                        <a:buClrTx/>
+                        <a:buSzTx/>
+                        <a:buFontTx/>
+                        <a:buNone/>
+                        <a:tabLst/>
+                        <a:defRPr/>
+                      </a:pPr>
+                      <a:r>
+                        <a:rPr lang="en-US" sz="1200" i="1" dirty="0"/>
+                        <a:t>Periodic Planning</a:t>
+                      </a:r>
+                    </a:p>
+                    <a:p>
+                      <a:pPr marL="0" marR="0" lvl="0" indent="0" algn="l" defTabSz="914377" rtl="0" eaLnBrk="1" fontAlgn="auto" latinLnBrk="0" hangingPunct="1">
+                        <a:lnSpc>
+                          <a:spcPct val="100000"/>
+                        </a:lnSpc>
+                        <a:spcBef>
+                          <a:spcPts val="0"/>
+                        </a:spcBef>
+                        <a:spcAft>
+                          <a:spcPts val="0"/>
+                        </a:spcAft>
+                        <a:buClrTx/>
+                        <a:buSzTx/>
+                        <a:buFontTx/>
+                        <a:buNone/>
+                        <a:tabLst/>
+                        <a:defRPr/>
+                      </a:pPr>
+                      <a:r>
+                        <a:rPr lang="en-US" sz="1200" i="1" dirty="0"/>
+                        <a:t>w/Event-Driven Replanning</a:t>
+                      </a:r>
+                    </a:p>
+                  </a:txBody>
+                  <a:tcPr>
+                    <a:lnL w="12700" cap="flat" cmpd="sng" algn="ctr">
+                      <a:solidFill>
+                        <a:schemeClr val="tx1"/>
+                      </a:solidFill>
+                      <a:prstDash val="solid"/>
+                      <a:round/>
+                      <a:headEnd type="none" w="med" len="med"/>
+                      <a:tailEnd type="none" w="med" len="med"/>
+                    </a:lnL>
+                    <a:lnR w="12700" cap="flat" cmpd="sng" algn="ctr">
+                      <a:solidFill>
+                        <a:schemeClr val="tx1"/>
+                      </a:solidFill>
+                      <a:prstDash val="solid"/>
+                      <a:round/>
+                      <a:headEnd type="none" w="med" len="med"/>
+                      <a:tailEnd type="none" w="med" len="med"/>
+                    </a:lnR>
+                    <a:lnT w="12700" cap="flat" cmpd="sng" algn="ctr">
+                      <a:solidFill>
+                        <a:schemeClr val="tx1"/>
+                      </a:solidFill>
+                      <a:prstDash val="solid"/>
+                      <a:round/>
+                      <a:headEnd type="none" w="med" len="med"/>
+                      <a:tailEnd type="none" w="med" len="med"/>
+                    </a:lnT>
+                    <a:lnB w="12700" cap="flat" cmpd="sng" algn="ctr">
+                      <a:solidFill>
+                        <a:schemeClr val="tx1"/>
+                      </a:solidFill>
+                      <a:prstDash val="solid"/>
+                      <a:round/>
+                      <a:headEnd type="none" w="med" len="med"/>
+                      <a:tailEnd type="none" w="med" len="med"/>
+                    </a:lnB>
+                  </a:tcPr>
+                </a:tc>
+                <a:tc>
+                  <a:txBody>
+                    <a:bodyPr/>
+                    <a:lstStyle/>
+                    <a:p>
+                      <a:pPr marL="0" marR="0" lvl="0" indent="0" algn="l" defTabSz="914377" rtl="0" eaLnBrk="1" fontAlgn="auto" latinLnBrk="0" hangingPunct="1">
+                        <a:lnSpc>
+                          <a:spcPct val="100000"/>
+                        </a:lnSpc>
+                        <a:spcBef>
+                          <a:spcPts val="0"/>
+                        </a:spcBef>
+                        <a:spcAft>
+                          <a:spcPts val="0"/>
+                        </a:spcAft>
+                        <a:buClrTx/>
+                        <a:buSzTx/>
+                        <a:buFontTx/>
+                        <a:buNone/>
+                        <a:tabLst/>
+                        <a:defRPr/>
+                      </a:pPr>
+                      <a:r>
+                        <a:rPr lang="en-US" sz="1200" dirty="0"/>
+                        <a:t>The start of a new planning horizon is reached</a:t>
+                      </a:r>
+                    </a:p>
+                    <a:p>
+                      <a:pPr marL="0" marR="0" lvl="0" indent="0" algn="l" defTabSz="914377" rtl="0" eaLnBrk="1" fontAlgn="auto" latinLnBrk="0" hangingPunct="1">
+                        <a:lnSpc>
+                          <a:spcPct val="100000"/>
+                        </a:lnSpc>
+                        <a:spcBef>
+                          <a:spcPts val="0"/>
+                        </a:spcBef>
+                        <a:spcAft>
+                          <a:spcPts val="0"/>
+                        </a:spcAft>
+                        <a:buClrTx/>
+                        <a:buSzTx/>
+                        <a:buFontTx/>
+                        <a:buNone/>
+                        <a:tabLst/>
+                        <a:defRPr/>
+                      </a:pPr>
+                      <a:r>
+                        <a:rPr lang="en-US" sz="1200" dirty="0"/>
+                        <a:t>or new doable measurement requests are received</a:t>
+                      </a:r>
+                    </a:p>
+                  </a:txBody>
+                  <a:tcPr>
+                    <a:lnL w="12700" cap="flat" cmpd="sng" algn="ctr">
+                      <a:solidFill>
+                        <a:schemeClr val="tx1"/>
+                      </a:solidFill>
+                      <a:prstDash val="solid"/>
+                      <a:round/>
+                      <a:headEnd type="none" w="med" len="med"/>
+                      <a:tailEnd type="none" w="med" len="med"/>
+                    </a:lnL>
+                    <a:lnR w="12700" cap="flat" cmpd="sng" algn="ctr">
+                      <a:solidFill>
+                        <a:schemeClr val="tx1"/>
+                      </a:solidFill>
+                      <a:prstDash val="solid"/>
+                      <a:round/>
+                      <a:headEnd type="none" w="med" len="med"/>
+                      <a:tailEnd type="none" w="med" len="med"/>
+                    </a:lnR>
+                    <a:lnT w="12700" cap="flat" cmpd="sng" algn="ctr">
+                      <a:solidFill>
+                        <a:schemeClr val="tx1"/>
+                      </a:solidFill>
+                      <a:prstDash val="solid"/>
+                      <a:round/>
+                      <a:headEnd type="none" w="med" len="med"/>
+                      <a:tailEnd type="none" w="med" len="med"/>
+                    </a:lnT>
+                    <a:lnB w="12700" cap="flat" cmpd="sng" algn="ctr">
+                      <a:solidFill>
+                        <a:schemeClr val="tx1"/>
+                      </a:solidFill>
+                      <a:prstDash val="solid"/>
+                      <a:round/>
+                      <a:headEnd type="none" w="med" len="med"/>
+                      <a:tailEnd type="none" w="med" len="med"/>
+                    </a:lnB>
+                  </a:tcPr>
+                </a:tc>
+                <a:tc>
+                  <a:txBody>
+                    <a:bodyPr/>
+                    <a:lstStyle/>
+                    <a:p>
+                      <a:pPr marL="0" marR="0" lvl="0" indent="0" algn="l" defTabSz="914377" rtl="0" eaLnBrk="1" fontAlgn="auto" latinLnBrk="0" hangingPunct="1">
+                        <a:lnSpc>
+                          <a:spcPct val="100000"/>
+                        </a:lnSpc>
+                        <a:spcBef>
+                          <a:spcPts val="0"/>
+                        </a:spcBef>
+                        <a:spcAft>
+                          <a:spcPts val="0"/>
+                        </a:spcAft>
+                        <a:buClrTx/>
+                        <a:buSzTx/>
+                        <a:buFontTx/>
+                        <a:buNone/>
+                        <a:tabLst/>
+                        <a:defRPr/>
+                      </a:pPr>
+                      <a:r>
+                        <a:rPr lang="en-US" sz="1200" dirty="0"/>
+                        <a:t>Next 1 </a:t>
+                      </a:r>
+                      <a:r>
+                        <a:rPr lang="en-US" sz="1200" dirty="0" err="1"/>
+                        <a:t>hr</a:t>
+                      </a:r>
+                      <a:r>
+                        <a:rPr lang="en-US" sz="1200" dirty="0"/>
+                        <a:t> mark</a:t>
+                      </a:r>
+                    </a:p>
+                  </a:txBody>
+                  <a:tcPr>
+                    <a:lnL w="12700" cap="flat" cmpd="sng" algn="ctr">
+                      <a:solidFill>
+                        <a:schemeClr val="tx1"/>
+                      </a:solidFill>
+                      <a:prstDash val="solid"/>
+                      <a:round/>
+                      <a:headEnd type="none" w="med" len="med"/>
+                      <a:tailEnd type="none" w="med" len="med"/>
+                    </a:lnL>
+                    <a:lnR w="12700" cap="flat" cmpd="sng" algn="ctr">
+                      <a:solidFill>
+                        <a:schemeClr val="tx1"/>
+                      </a:solidFill>
+                      <a:prstDash val="solid"/>
+                      <a:round/>
+                      <a:headEnd type="none" w="med" len="med"/>
+                      <a:tailEnd type="none" w="med" len="med"/>
+                    </a:lnR>
+                    <a:lnT w="12700" cap="flat" cmpd="sng" algn="ctr">
+                      <a:solidFill>
+                        <a:schemeClr val="tx1"/>
+                      </a:solidFill>
+                      <a:prstDash val="solid"/>
+                      <a:round/>
+                      <a:headEnd type="none" w="med" len="med"/>
+                      <a:tailEnd type="none" w="med" len="med"/>
+                    </a:lnT>
+                    <a:lnB w="12700" cap="flat" cmpd="sng" algn="ctr">
+                      <a:solidFill>
+                        <a:schemeClr val="tx1"/>
+                      </a:solidFill>
+                      <a:prstDash val="solid"/>
+                      <a:round/>
+                      <a:headEnd type="none" w="med" len="med"/>
+                      <a:tailEnd type="none" w="med" len="med"/>
+                    </a:lnB>
+                  </a:tcPr>
+                </a:tc>
+                <a:extLst>
+                  <a:ext uri="{0D108BD9-81ED-4DB2-BD59-A6C34878D82A}">
+                    <a16:rowId xmlns:a16="http://schemas.microsoft.com/office/drawing/2014/main" val="703909375"/>
+                  </a:ext>
+                </a:extLst>
+              </a:tr>
+            </a:tbl>
+          </a:graphicData>
+        </a:graphic>
+      </p:graphicFrame>
     </p:spTree>
     <p:extLst>
       <p:ext uri="{BB962C8B-B14F-4D97-AF65-F5344CB8AC3E}">
@@ -4719,6 +5955,535 @@
 </file>
 
 <file path=ppt/slides/slide5.xml><?xml version="1.0" encoding="utf-8"?>
+<p:sld xmlns:a="http://schemas.openxmlformats.org/drawingml/2006/main" xmlns:r="http://schemas.openxmlformats.org/officeDocument/2006/relationships" xmlns:p="http://schemas.openxmlformats.org/presentationml/2006/main">
+  <p:cSld>
+    <p:spTree>
+      <p:nvGrpSpPr>
+        <p:cNvPr id="1" name=""/>
+        <p:cNvGrpSpPr/>
+        <p:nvPr/>
+      </p:nvGrpSpPr>
+      <p:grpSpPr>
+        <a:xfrm>
+          <a:off x="0" y="0"/>
+          <a:ext cx="0" cy="0"/>
+          <a:chOff x="0" y="0"/>
+          <a:chExt cx="0" cy="0"/>
+        </a:xfrm>
+      </p:grpSpPr>
+      <p:sp>
+        <p:nvSpPr>
+          <p:cNvPr id="2" name="Title 1">
+            <a:extLst>
+              <a:ext uri="{FF2B5EF4-FFF2-40B4-BE49-F238E27FC236}">
+                <a16:creationId xmlns:a16="http://schemas.microsoft.com/office/drawing/2014/main" id="{2CE58C7A-B4E3-1F27-FE46-5E6738387262}"/>
+              </a:ext>
+            </a:extLst>
+          </p:cNvPr>
+          <p:cNvSpPr>
+            <a:spLocks noGrp="1"/>
+          </p:cNvSpPr>
+          <p:nvPr>
+            <p:ph type="title"/>
+          </p:nvPr>
+        </p:nvSpPr>
+        <p:spPr/>
+        <p:txBody>
+          <a:bodyPr/>
+          <a:lstStyle/>
+          <a:p>
+            <a:r>
+              <a:rPr lang="en-US"/>
+              <a:t>Preliminary Results</a:t>
+            </a:r>
+            <a:endParaRPr lang="en-US" dirty="0"/>
+          </a:p>
+        </p:txBody>
+      </p:sp>
+      <p:pic>
+        <p:nvPicPr>
+          <p:cNvPr id="7" name="Content Placeholder 6" descr="A graph of different colored bars&#10;&#10;Description automatically generated">
+            <a:extLst>
+              <a:ext uri="{FF2B5EF4-FFF2-40B4-BE49-F238E27FC236}">
+                <a16:creationId xmlns:a16="http://schemas.microsoft.com/office/drawing/2014/main" id="{2DFD0333-1D18-E528-D3B4-DFEC3DBA4751}"/>
+              </a:ext>
+            </a:extLst>
+          </p:cNvPr>
+          <p:cNvPicPr>
+            <a:picLocks noGrp="1" noChangeAspect="1"/>
+          </p:cNvPicPr>
+          <p:nvPr>
+            <p:ph idx="1"/>
+          </p:nvPr>
+        </p:nvPicPr>
+        <p:blipFill>
+          <a:blip r:embed="rId2"/>
+          <a:stretch>
+            <a:fillRect/>
+          </a:stretch>
+        </p:blipFill>
+        <p:spPr>
+          <a:xfrm>
+            <a:off x="4711690" y="1286695"/>
+            <a:ext cx="7315200" cy="4381500"/>
+          </a:xfrm>
+        </p:spPr>
+      </p:pic>
+      <p:sp>
+        <p:nvSpPr>
+          <p:cNvPr id="8" name="Content Placeholder 2">
+            <a:extLst>
+              <a:ext uri="{FF2B5EF4-FFF2-40B4-BE49-F238E27FC236}">
+                <a16:creationId xmlns:a16="http://schemas.microsoft.com/office/drawing/2014/main" id="{02A20B02-E311-9E33-7CD7-8702DABA064A}"/>
+              </a:ext>
+            </a:extLst>
+          </p:cNvPr>
+          <p:cNvSpPr txBox="1">
+            <a:spLocks/>
+          </p:cNvSpPr>
+          <p:nvPr/>
+        </p:nvSpPr>
+        <p:spPr>
+          <a:xfrm>
+            <a:off x="213555" y="1682076"/>
+            <a:ext cx="4449690" cy="4161731"/>
+          </a:xfrm>
+          <a:prstGeom prst="rect">
+            <a:avLst/>
+          </a:prstGeom>
+        </p:spPr>
+        <p:txBody>
+          <a:bodyPr vert="horz" lIns="91440" tIns="45720" rIns="91440" bIns="45720" rtlCol="0">
+            <a:normAutofit/>
+          </a:bodyPr>
+          <a:lstStyle>
+            <a:lvl1pPr marL="0" indent="0" algn="l" defTabSz="914377" rtl="0" eaLnBrk="1" latinLnBrk="0" hangingPunct="1">
+              <a:lnSpc>
+                <a:spcPct val="90000"/>
+              </a:lnSpc>
+              <a:spcBef>
+                <a:spcPts val="1000"/>
+              </a:spcBef>
+              <a:buFont typeface="Arial" panose="020B0604020202020204" pitchFamily="34" charset="0"/>
+              <a:buNone/>
+              <a:defRPr sz="2800" b="0" i="0" kern="1200">
+                <a:solidFill>
+                  <a:schemeClr val="tx1"/>
+                </a:solidFill>
+                <a:latin typeface="Helvetica" pitchFamily="2" charset="0"/>
+                <a:ea typeface="+mn-ea"/>
+                <a:cs typeface="+mn-cs"/>
+              </a:defRPr>
+            </a:lvl1pPr>
+            <a:lvl2pPr marL="293688" indent="-231775" algn="l" defTabSz="914377" rtl="0" eaLnBrk="1" latinLnBrk="0" hangingPunct="1">
+              <a:lnSpc>
+                <a:spcPct val="90000"/>
+              </a:lnSpc>
+              <a:spcBef>
+                <a:spcPts val="500"/>
+              </a:spcBef>
+              <a:buFont typeface="Arial" panose="020B0604020202020204" pitchFamily="34" charset="0"/>
+              <a:buChar char="•"/>
+              <a:tabLst/>
+              <a:defRPr sz="2400" b="0" i="0" kern="1200">
+                <a:solidFill>
+                  <a:schemeClr val="tx1"/>
+                </a:solidFill>
+                <a:latin typeface="Helvetica" pitchFamily="2" charset="0"/>
+                <a:ea typeface="+mn-ea"/>
+                <a:cs typeface="+mn-cs"/>
+              </a:defRPr>
+            </a:lvl2pPr>
+            <a:lvl3pPr marL="460375" indent="-219075" algn="l" defTabSz="914377" rtl="0" eaLnBrk="1" latinLnBrk="0" hangingPunct="1">
+              <a:lnSpc>
+                <a:spcPct val="90000"/>
+              </a:lnSpc>
+              <a:spcBef>
+                <a:spcPts val="500"/>
+              </a:spcBef>
+              <a:buFont typeface="Arial" panose="020B0604020202020204" pitchFamily="34" charset="0"/>
+              <a:buChar char="•"/>
+              <a:tabLst/>
+              <a:defRPr sz="2000" b="0" i="0" kern="1200">
+                <a:solidFill>
+                  <a:schemeClr val="tx1"/>
+                </a:solidFill>
+                <a:latin typeface="Helvetica" pitchFamily="2" charset="0"/>
+                <a:ea typeface="+mn-ea"/>
+                <a:cs typeface="+mn-cs"/>
+              </a:defRPr>
+            </a:lvl3pPr>
+            <a:lvl4pPr marL="628650" indent="-230188" algn="l" defTabSz="914377" rtl="0" eaLnBrk="1" latinLnBrk="0" hangingPunct="1">
+              <a:lnSpc>
+                <a:spcPct val="90000"/>
+              </a:lnSpc>
+              <a:spcBef>
+                <a:spcPts val="500"/>
+              </a:spcBef>
+              <a:buFont typeface="Arial" panose="020B0604020202020204" pitchFamily="34" charset="0"/>
+              <a:buChar char="•"/>
+              <a:tabLst/>
+              <a:defRPr sz="1800" b="0" i="0" kern="1200">
+                <a:solidFill>
+                  <a:schemeClr val="tx1"/>
+                </a:solidFill>
+                <a:latin typeface="Helvetica" pitchFamily="2" charset="0"/>
+                <a:ea typeface="+mn-ea"/>
+                <a:cs typeface="+mn-cs"/>
+              </a:defRPr>
+            </a:lvl4pPr>
+            <a:lvl5pPr marL="808038" indent="-211138" algn="l" defTabSz="914377" rtl="0" eaLnBrk="1" latinLnBrk="0" hangingPunct="1">
+              <a:lnSpc>
+                <a:spcPct val="90000"/>
+              </a:lnSpc>
+              <a:spcBef>
+                <a:spcPts val="500"/>
+              </a:spcBef>
+              <a:buFont typeface="Arial" panose="020B0604020202020204" pitchFamily="34" charset="0"/>
+              <a:buChar char="•"/>
+              <a:tabLst/>
+              <a:defRPr sz="1800" b="0" i="0" kern="1200">
+                <a:solidFill>
+                  <a:schemeClr val="tx1"/>
+                </a:solidFill>
+                <a:latin typeface="Helvetica" pitchFamily="2" charset="0"/>
+                <a:ea typeface="+mn-ea"/>
+                <a:cs typeface="+mn-cs"/>
+              </a:defRPr>
+            </a:lvl5pPr>
+            <a:lvl6pPr marL="2514537" indent="-228594" algn="l" defTabSz="914377" rtl="0" eaLnBrk="1" latinLnBrk="0" hangingPunct="1">
+              <a:lnSpc>
+                <a:spcPct val="90000"/>
+              </a:lnSpc>
+              <a:spcBef>
+                <a:spcPts val="500"/>
+              </a:spcBef>
+              <a:buFont typeface="Arial" panose="020B0604020202020204" pitchFamily="34" charset="0"/>
+              <a:buChar char="•"/>
+              <a:defRPr sz="1800" kern="1200">
+                <a:solidFill>
+                  <a:schemeClr val="tx1"/>
+                </a:solidFill>
+                <a:latin typeface="+mn-lt"/>
+                <a:ea typeface="+mn-ea"/>
+                <a:cs typeface="+mn-cs"/>
+              </a:defRPr>
+            </a:lvl6pPr>
+            <a:lvl7pPr marL="2971726" indent="-228594" algn="l" defTabSz="914377" rtl="0" eaLnBrk="1" latinLnBrk="0" hangingPunct="1">
+              <a:lnSpc>
+                <a:spcPct val="90000"/>
+              </a:lnSpc>
+              <a:spcBef>
+                <a:spcPts val="500"/>
+              </a:spcBef>
+              <a:buFont typeface="Arial" panose="020B0604020202020204" pitchFamily="34" charset="0"/>
+              <a:buChar char="•"/>
+              <a:defRPr sz="1800" kern="1200">
+                <a:solidFill>
+                  <a:schemeClr val="tx1"/>
+                </a:solidFill>
+                <a:latin typeface="+mn-lt"/>
+                <a:ea typeface="+mn-ea"/>
+                <a:cs typeface="+mn-cs"/>
+              </a:defRPr>
+            </a:lvl7pPr>
+            <a:lvl8pPr marL="3428914" indent="-228594" algn="l" defTabSz="914377" rtl="0" eaLnBrk="1" latinLnBrk="0" hangingPunct="1">
+              <a:lnSpc>
+                <a:spcPct val="90000"/>
+              </a:lnSpc>
+              <a:spcBef>
+                <a:spcPts val="500"/>
+              </a:spcBef>
+              <a:buFont typeface="Arial" panose="020B0604020202020204" pitchFamily="34" charset="0"/>
+              <a:buChar char="•"/>
+              <a:defRPr sz="1800" kern="1200">
+                <a:solidFill>
+                  <a:schemeClr val="tx1"/>
+                </a:solidFill>
+                <a:latin typeface="+mn-lt"/>
+                <a:ea typeface="+mn-ea"/>
+                <a:cs typeface="+mn-cs"/>
+              </a:defRPr>
+            </a:lvl8pPr>
+            <a:lvl9pPr marL="3886103" indent="-228594" algn="l" defTabSz="914377" rtl="0" eaLnBrk="1" latinLnBrk="0" hangingPunct="1">
+              <a:lnSpc>
+                <a:spcPct val="90000"/>
+              </a:lnSpc>
+              <a:spcBef>
+                <a:spcPts val="500"/>
+              </a:spcBef>
+              <a:buFont typeface="Arial" panose="020B0604020202020204" pitchFamily="34" charset="0"/>
+              <a:buChar char="•"/>
+              <a:defRPr sz="1800" kern="1200">
+                <a:solidFill>
+                  <a:schemeClr val="tx1"/>
+                </a:solidFill>
+                <a:latin typeface="+mn-lt"/>
+                <a:ea typeface="+mn-ea"/>
+                <a:cs typeface="+mn-cs"/>
+              </a:defRPr>
+            </a:lvl9pPr>
+          </a:lstStyle>
+          <a:p>
+            <a:r>
+              <a:rPr lang="en-US" sz="1800" b="1" dirty="0"/>
+              <a:t>Definitions</a:t>
+            </a:r>
+            <a:endParaRPr lang="en-US" sz="1400" b="1" dirty="0"/>
+          </a:p>
+          <a:p>
+            <a:pPr marL="457200" indent="-457200">
+              <a:buFont typeface="Arial" panose="020B0604020202020204" pitchFamily="34" charset="0"/>
+              <a:buChar char="•"/>
+            </a:pPr>
+            <a:r>
+              <a:rPr lang="en-US" sz="1400" i="1" dirty="0"/>
+              <a:t>Observations Made</a:t>
+            </a:r>
+            <a:r>
+              <a:rPr lang="en-US" sz="1400" dirty="0"/>
+              <a:t>: single-instrument observations performed by all agents</a:t>
+            </a:r>
+          </a:p>
+          <a:p>
+            <a:pPr marL="457200" indent="-457200">
+              <a:buFont typeface="Arial" panose="020B0604020202020204" pitchFamily="34" charset="0"/>
+              <a:buChar char="•"/>
+            </a:pPr>
+            <a:r>
+              <a:rPr lang="en-US" sz="1400" i="1" dirty="0"/>
+              <a:t>Max Unique Observations</a:t>
+            </a:r>
+            <a:r>
+              <a:rPr lang="en-US" sz="1400" dirty="0"/>
+              <a:t>: maximum number of unique observations possible due to coverage</a:t>
+            </a:r>
+          </a:p>
+          <a:p>
+            <a:pPr marL="457200" indent="-457200">
+              <a:buFont typeface="Arial" panose="020B0604020202020204" pitchFamily="34" charset="0"/>
+              <a:buChar char="•"/>
+            </a:pPr>
+            <a:r>
+              <a:rPr lang="en-US" sz="1400" i="1" dirty="0"/>
+              <a:t>Unique Observations Made: </a:t>
+            </a:r>
+            <a:r>
+              <a:rPr lang="en-US" sz="1400" dirty="0"/>
+              <a:t>number of unique observations performed by all agents</a:t>
+            </a:r>
+            <a:endParaRPr lang="en-US" sz="1400" i="1" dirty="0"/>
+          </a:p>
+          <a:p>
+            <a:pPr marL="457200" indent="-457200">
+              <a:buFont typeface="Arial" panose="020B0604020202020204" pitchFamily="34" charset="0"/>
+              <a:buChar char="•"/>
+            </a:pPr>
+            <a:r>
+              <a:rPr lang="en-US" sz="1400" i="1" dirty="0"/>
+              <a:t>Co-Observations Made: </a:t>
+            </a:r>
+            <a:r>
+              <a:rPr lang="en-US" sz="1400" dirty="0"/>
+              <a:t>number of co-observations performed by all agents</a:t>
+            </a:r>
+          </a:p>
+          <a:p>
+            <a:r>
+              <a:rPr lang="en-US" sz="1400" dirty="0"/>
+              <a:t>All results include the initial 100 measurement requests + all event-generated measurement requests</a:t>
+            </a:r>
+          </a:p>
+        </p:txBody>
+      </p:sp>
+    </p:spTree>
+    <p:extLst>
+      <p:ext uri="{BB962C8B-B14F-4D97-AF65-F5344CB8AC3E}">
+        <p14:creationId xmlns:p14="http://schemas.microsoft.com/office/powerpoint/2010/main" val="4001703616"/>
+      </p:ext>
+    </p:extLst>
+  </p:cSld>
+  <p:clrMapOvr>
+    <a:masterClrMapping/>
+  </p:clrMapOvr>
+</p:sld>
+</file>
+
+<file path=ppt/slides/slide6.xml><?xml version="1.0" encoding="utf-8"?>
+<p:sld xmlns:a="http://schemas.openxmlformats.org/drawingml/2006/main" xmlns:r="http://schemas.openxmlformats.org/officeDocument/2006/relationships" xmlns:p="http://schemas.openxmlformats.org/presentationml/2006/main">
+  <p:cSld>
+    <p:spTree>
+      <p:nvGrpSpPr>
+        <p:cNvPr id="1" name=""/>
+        <p:cNvGrpSpPr/>
+        <p:nvPr/>
+      </p:nvGrpSpPr>
+      <p:grpSpPr>
+        <a:xfrm>
+          <a:off x="0" y="0"/>
+          <a:ext cx="0" cy="0"/>
+          <a:chOff x="0" y="0"/>
+          <a:chExt cx="0" cy="0"/>
+        </a:xfrm>
+      </p:grpSpPr>
+      <p:sp>
+        <p:nvSpPr>
+          <p:cNvPr id="2" name="Title 1">
+            <a:extLst>
+              <a:ext uri="{FF2B5EF4-FFF2-40B4-BE49-F238E27FC236}">
+                <a16:creationId xmlns:a16="http://schemas.microsoft.com/office/drawing/2014/main" id="{833F0B49-2CC0-9482-3A71-B8E983342986}"/>
+              </a:ext>
+            </a:extLst>
+          </p:cNvPr>
+          <p:cNvSpPr>
+            <a:spLocks noGrp="1"/>
+          </p:cNvSpPr>
+          <p:nvPr>
+            <p:ph type="title"/>
+          </p:nvPr>
+        </p:nvSpPr>
+        <p:spPr/>
+        <p:txBody>
+          <a:bodyPr/>
+          <a:lstStyle/>
+          <a:p>
+            <a:r>
+              <a:rPr lang="en-US" dirty="0"/>
+              <a:t>Discussion</a:t>
+            </a:r>
+          </a:p>
+        </p:txBody>
+      </p:sp>
+      <p:sp>
+        <p:nvSpPr>
+          <p:cNvPr id="3" name="Content Placeholder 2">
+            <a:extLst>
+              <a:ext uri="{FF2B5EF4-FFF2-40B4-BE49-F238E27FC236}">
+                <a16:creationId xmlns:a16="http://schemas.microsoft.com/office/drawing/2014/main" id="{B5833F4B-5CB9-EEED-7016-432F18A1621D}"/>
+              </a:ext>
+            </a:extLst>
+          </p:cNvPr>
+          <p:cNvSpPr>
+            <a:spLocks noGrp="1"/>
+          </p:cNvSpPr>
+          <p:nvPr>
+            <p:ph idx="1"/>
+          </p:nvPr>
+        </p:nvSpPr>
+        <p:spPr/>
+        <p:txBody>
+          <a:bodyPr>
+            <a:normAutofit/>
+          </a:bodyPr>
+          <a:lstStyle/>
+          <a:p>
+            <a:pPr marL="457200" indent="-457200">
+              <a:buFont typeface="Arial" panose="020B0604020202020204" pitchFamily="34" charset="0"/>
+              <a:buChar char="•"/>
+            </a:pPr>
+            <a:r>
+              <a:rPr lang="en-US" sz="2000" dirty="0"/>
+              <a:t>Trends match expected behavior, but number of events observed do not match Ben’s results yet</a:t>
+            </a:r>
+          </a:p>
+          <a:p>
+            <a:pPr marL="750888" lvl="1" indent="-457200"/>
+            <a:r>
+              <a:rPr lang="en-US" sz="1800" dirty="0"/>
+              <a:t>Mismatch might be due to different definitions of </a:t>
+            </a:r>
+            <a:r>
+              <a:rPr lang="en-US" sz="1800" i="1" dirty="0"/>
+              <a:t>observed events</a:t>
+            </a:r>
+            <a:endParaRPr lang="en-US" sz="1800" dirty="0"/>
+          </a:p>
+          <a:p>
+            <a:pPr marL="457200" indent="-457200">
+              <a:buFont typeface="Arial" panose="020B0604020202020204" pitchFamily="34" charset="0"/>
+              <a:buChar char="•"/>
+            </a:pPr>
+            <a:r>
+              <a:rPr lang="en-US" sz="2000" dirty="0"/>
+              <a:t>Very high number of repeating observations performed by agents on all cases</a:t>
+            </a:r>
+            <a:endParaRPr lang="en-US" sz="1600" dirty="0"/>
+          </a:p>
+          <a:p>
+            <a:pPr marL="457200" indent="-457200">
+              <a:buFont typeface="Arial" panose="020B0604020202020204" pitchFamily="34" charset="0"/>
+              <a:buChar char="•"/>
+            </a:pPr>
+            <a:r>
+              <a:rPr lang="en-US" sz="2000" dirty="0"/>
+              <a:t>Utility Function was not considered during scheduling</a:t>
+            </a:r>
+          </a:p>
+          <a:p>
+            <a:pPr marL="457200" indent="-457200">
+              <a:buFont typeface="Arial" panose="020B0604020202020204" pitchFamily="34" charset="0"/>
+              <a:buChar char="•"/>
+            </a:pPr>
+            <a:r>
+              <a:rPr lang="en-US" sz="2000" dirty="0"/>
+              <a:t>Scenario highlighted previously unknown bugs within DMAS</a:t>
+            </a:r>
+          </a:p>
+          <a:p>
+            <a:endParaRPr lang="en-US" sz="2000" b="1" dirty="0"/>
+          </a:p>
+          <a:p>
+            <a:r>
+              <a:rPr lang="en-US" sz="2000" b="1" dirty="0"/>
+              <a:t>Next Steps</a:t>
+            </a:r>
+          </a:p>
+          <a:p>
+            <a:pPr marL="457200" indent="-457200">
+              <a:buFont typeface="Arial" panose="020B0604020202020204" pitchFamily="34" charset="0"/>
+              <a:buChar char="•"/>
+            </a:pPr>
+            <a:r>
+              <a:rPr lang="en-US" sz="2000" dirty="0"/>
+              <a:t>Bug-fixing</a:t>
+            </a:r>
+          </a:p>
+          <a:p>
+            <a:pPr marL="457200" indent="-457200">
+              <a:buFont typeface="Arial" panose="020B0604020202020204" pitchFamily="34" charset="0"/>
+              <a:buChar char="•"/>
+            </a:pPr>
+            <a:r>
+              <a:rPr lang="en-US" sz="2000" dirty="0"/>
+              <a:t>Integration of existing CBBA in DMAS w/ new Preplanning/Replanning strategies and framework</a:t>
+            </a:r>
+          </a:p>
+          <a:p>
+            <a:pPr marL="457200" indent="-457200">
+              <a:buFont typeface="Arial" panose="020B0604020202020204" pitchFamily="34" charset="0"/>
+              <a:buChar char="•"/>
+            </a:pPr>
+            <a:r>
+              <a:rPr lang="en-US" sz="2000" dirty="0"/>
+              <a:t>Comparison of CBBA vs FIFO as replanning strategy</a:t>
+            </a:r>
+          </a:p>
+        </p:txBody>
+      </p:sp>
+    </p:spTree>
+    <p:extLst>
+      <p:ext uri="{BB962C8B-B14F-4D97-AF65-F5344CB8AC3E}">
+        <p14:creationId xmlns:p14="http://schemas.microsoft.com/office/powerpoint/2010/main" val="390543131"/>
+      </p:ext>
+    </p:extLst>
+  </p:cSld>
+  <p:clrMapOvr>
+    <a:masterClrMapping/>
+  </p:clrMapOvr>
+</p:sld>
+</file>
+
+<file path=ppt/slides/slide7.xml><?xml version="1.0" encoding="utf-8"?>
 <p:sld xmlns:a="http://schemas.openxmlformats.org/drawingml/2006/main" xmlns:r="http://schemas.openxmlformats.org/officeDocument/2006/relationships" xmlns:p="http://schemas.openxmlformats.org/presentationml/2006/main">
   <p:cSld>
     <p:spTree>

</xml_diff>